<commit_message>
Prepared camera ready version.
</commit_message>
<xml_diff>
--- a/img/annotatedSample.pptx
+++ b/img/annotatedSample.pptx
@@ -5,8 +5,9 @@
     <p:sldMasterId id="2147483648" r:id="rId1"/>
   </p:sldMasterIdLst>
   <p:sldIdLst>
-    <p:sldId id="256" r:id="rId2"/>
-    <p:sldId id="257" r:id="rId3"/>
+    <p:sldId id="258" r:id="rId2"/>
+    <p:sldId id="256" r:id="rId3"/>
+    <p:sldId id="257" r:id="rId4"/>
   </p:sldIdLst>
   <p:sldSz cx="2879725" cy="5400675"/>
   <p:notesSz cx="6858000" cy="9144000"/>
@@ -289,7 +290,7 @@
           <a:p>
             <a:fld id="{1BA50D42-C9CD-4801-B293-61D1F53EC57E}" type="datetimeFigureOut">
               <a:rPr lang="de-DE" smtClean="0"/>
-              <a:t>05.09.2017</a:t>
+              <a:t>27.10.2017</a:t>
             </a:fld>
             <a:endParaRPr lang="de-DE"/>
           </a:p>
@@ -454,7 +455,7 @@
           <a:p>
             <a:fld id="{1BA50D42-C9CD-4801-B293-61D1F53EC57E}" type="datetimeFigureOut">
               <a:rPr lang="de-DE" smtClean="0"/>
-              <a:t>05.09.2017</a:t>
+              <a:t>27.10.2017</a:t>
             </a:fld>
             <a:endParaRPr lang="de-DE"/>
           </a:p>
@@ -629,7 +630,7 @@
           <a:p>
             <a:fld id="{1BA50D42-C9CD-4801-B293-61D1F53EC57E}" type="datetimeFigureOut">
               <a:rPr lang="de-DE" smtClean="0"/>
-              <a:t>05.09.2017</a:t>
+              <a:t>27.10.2017</a:t>
             </a:fld>
             <a:endParaRPr lang="de-DE"/>
           </a:p>
@@ -794,7 +795,7 @@
           <a:p>
             <a:fld id="{1BA50D42-C9CD-4801-B293-61D1F53EC57E}" type="datetimeFigureOut">
               <a:rPr lang="de-DE" smtClean="0"/>
-              <a:t>05.09.2017</a:t>
+              <a:t>27.10.2017</a:t>
             </a:fld>
             <a:endParaRPr lang="de-DE"/>
           </a:p>
@@ -1035,7 +1036,7 @@
           <a:p>
             <a:fld id="{1BA50D42-C9CD-4801-B293-61D1F53EC57E}" type="datetimeFigureOut">
               <a:rPr lang="de-DE" smtClean="0"/>
-              <a:t>05.09.2017</a:t>
+              <a:t>27.10.2017</a:t>
             </a:fld>
             <a:endParaRPr lang="de-DE"/>
           </a:p>
@@ -1318,7 +1319,7 @@
           <a:p>
             <a:fld id="{1BA50D42-C9CD-4801-B293-61D1F53EC57E}" type="datetimeFigureOut">
               <a:rPr lang="de-DE" smtClean="0"/>
-              <a:t>05.09.2017</a:t>
+              <a:t>27.10.2017</a:t>
             </a:fld>
             <a:endParaRPr lang="de-DE"/>
           </a:p>
@@ -1735,7 +1736,7 @@
           <a:p>
             <a:fld id="{1BA50D42-C9CD-4801-B293-61D1F53EC57E}" type="datetimeFigureOut">
               <a:rPr lang="de-DE" smtClean="0"/>
-              <a:t>05.09.2017</a:t>
+              <a:t>27.10.2017</a:t>
             </a:fld>
             <a:endParaRPr lang="de-DE"/>
           </a:p>
@@ -1848,7 +1849,7 @@
           <a:p>
             <a:fld id="{1BA50D42-C9CD-4801-B293-61D1F53EC57E}" type="datetimeFigureOut">
               <a:rPr lang="de-DE" smtClean="0"/>
-              <a:t>05.09.2017</a:t>
+              <a:t>27.10.2017</a:t>
             </a:fld>
             <a:endParaRPr lang="de-DE"/>
           </a:p>
@@ -1938,7 +1939,7 @@
           <a:p>
             <a:fld id="{1BA50D42-C9CD-4801-B293-61D1F53EC57E}" type="datetimeFigureOut">
               <a:rPr lang="de-DE" smtClean="0"/>
-              <a:t>05.09.2017</a:t>
+              <a:t>27.10.2017</a:t>
             </a:fld>
             <a:endParaRPr lang="de-DE"/>
           </a:p>
@@ -2210,7 +2211,7 @@
           <a:p>
             <a:fld id="{1BA50D42-C9CD-4801-B293-61D1F53EC57E}" type="datetimeFigureOut">
               <a:rPr lang="de-DE" smtClean="0"/>
-              <a:t>05.09.2017</a:t>
+              <a:t>27.10.2017</a:t>
             </a:fld>
             <a:endParaRPr lang="de-DE"/>
           </a:p>
@@ -2458,7 +2459,7 @@
           <a:p>
             <a:fld id="{1BA50D42-C9CD-4801-B293-61D1F53EC57E}" type="datetimeFigureOut">
               <a:rPr lang="de-DE" smtClean="0"/>
-              <a:t>05.09.2017</a:t>
+              <a:t>27.10.2017</a:t>
             </a:fld>
             <a:endParaRPr lang="de-DE"/>
           </a:p>
@@ -2666,7 +2667,7 @@
           <a:p>
             <a:fld id="{1BA50D42-C9CD-4801-B293-61D1F53EC57E}" type="datetimeFigureOut">
               <a:rPr lang="de-DE" smtClean="0"/>
-              <a:t>05.09.2017</a:t>
+              <a:t>27.10.2017</a:t>
             </a:fld>
             <a:endParaRPr lang="de-DE"/>
           </a:p>
@@ -3036,6 +3037,1507 @@
           <a:chExt cx="0" cy="0"/>
         </a:xfrm>
       </p:grpSpPr>
+      <p:grpSp>
+        <p:nvGrpSpPr>
+          <p:cNvPr id="4" name="Gruppieren 3"/>
+          <p:cNvGrpSpPr/>
+          <p:nvPr/>
+        </p:nvGrpSpPr>
+        <p:grpSpPr>
+          <a:xfrm>
+            <a:off x="413" y="0"/>
+            <a:ext cx="2879312" cy="1821599"/>
+            <a:chOff x="-6049" y="323850"/>
+            <a:chExt cx="2879312" cy="1821599"/>
+          </a:xfrm>
+        </p:grpSpPr>
+        <p:pic>
+          <p:nvPicPr>
+            <p:cNvPr id="1026" name="Picture 2"/>
+            <p:cNvPicPr>
+              <a:picLocks noChangeAspect="1" noChangeArrowheads="1"/>
+            </p:cNvPicPr>
+            <p:nvPr/>
+          </p:nvPicPr>
+          <p:blipFill rotWithShape="1">
+            <a:blip r:embed="rId2" cstate="print">
+              <a:extLst>
+                <a:ext uri="{28A0092B-C50C-407E-A947-70E740481C1C}">
+                  <a14:useLocalDpi xmlns:a14="http://schemas.microsoft.com/office/drawing/2010/main" val="0"/>
+                </a:ext>
+              </a:extLst>
+            </a:blip>
+            <a:srcRect t="15095"/>
+            <a:stretch/>
+          </p:blipFill>
+          <p:spPr bwMode="auto">
+            <a:xfrm>
+              <a:off x="-6049" y="323850"/>
+              <a:ext cx="2879312" cy="1821599"/>
+            </a:xfrm>
+            <a:prstGeom prst="rect">
+              <a:avLst/>
+            </a:prstGeom>
+            <a:noFill/>
+            <a:ln>
+              <a:noFill/>
+            </a:ln>
+            <a:extLst>
+              <a:ext uri="{909E8E84-426E-40DD-AFC4-6F175D3DCCD1}">
+                <a14:hiddenFill xmlns:a14="http://schemas.microsoft.com/office/drawing/2010/main">
+                  <a:solidFill>
+                    <a:schemeClr val="accent1"/>
+                  </a:solidFill>
+                </a14:hiddenFill>
+              </a:ext>
+              <a:ext uri="{91240B29-F687-4F45-9708-019B960494DF}">
+                <a14:hiddenLine xmlns:a14="http://schemas.microsoft.com/office/drawing/2010/main" w="9525">
+                  <a:solidFill>
+                    <a:schemeClr val="tx1"/>
+                  </a:solidFill>
+                  <a:miter lim="800000"/>
+                  <a:headEnd/>
+                  <a:tailEnd/>
+                </a14:hiddenLine>
+              </a:ext>
+            </a:extLst>
+          </p:spPr>
+        </p:pic>
+        <p:sp>
+          <p:nvSpPr>
+            <p:cNvPr id="2" name="Rechteck 1"/>
+            <p:cNvSpPr/>
+            <p:nvPr/>
+          </p:nvSpPr>
+          <p:spPr>
+            <a:xfrm>
+              <a:off x="766761" y="1081088"/>
+              <a:ext cx="276226" cy="364331"/>
+            </a:xfrm>
+            <a:prstGeom prst="rect">
+              <a:avLst/>
+            </a:prstGeom>
+            <a:noFill/>
+            <a:ln w="9525">
+              <a:solidFill>
+                <a:srgbClr val="00FF00"/>
+              </a:solidFill>
+            </a:ln>
+          </p:spPr>
+          <p:style>
+            <a:lnRef idx="2">
+              <a:schemeClr val="accent1">
+                <a:shade val="50000"/>
+              </a:schemeClr>
+            </a:lnRef>
+            <a:fillRef idx="1">
+              <a:schemeClr val="accent1"/>
+            </a:fillRef>
+            <a:effectRef idx="0">
+              <a:schemeClr val="accent1"/>
+            </a:effectRef>
+            <a:fontRef idx="minor">
+              <a:schemeClr val="lt1"/>
+            </a:fontRef>
+          </p:style>
+          <p:txBody>
+            <a:bodyPr rtlCol="0" anchor="ctr"/>
+            <a:lstStyle/>
+            <a:p>
+              <a:pPr algn="ctr"/>
+              <a:endParaRPr lang="de-DE"/>
+            </a:p>
+          </p:txBody>
+        </p:sp>
+        <p:sp>
+          <p:nvSpPr>
+            <p:cNvPr id="5" name="Rechteck 4"/>
+            <p:cNvSpPr/>
+            <p:nvPr/>
+          </p:nvSpPr>
+          <p:spPr>
+            <a:xfrm>
+              <a:off x="23811" y="1254919"/>
+              <a:ext cx="100013" cy="152400"/>
+            </a:xfrm>
+            <a:prstGeom prst="rect">
+              <a:avLst/>
+            </a:prstGeom>
+            <a:noFill/>
+            <a:ln w="9525">
+              <a:solidFill>
+                <a:srgbClr val="00FF00"/>
+              </a:solidFill>
+            </a:ln>
+          </p:spPr>
+          <p:style>
+            <a:lnRef idx="2">
+              <a:schemeClr val="accent1">
+                <a:shade val="50000"/>
+              </a:schemeClr>
+            </a:lnRef>
+            <a:fillRef idx="1">
+              <a:schemeClr val="accent1"/>
+            </a:fillRef>
+            <a:effectRef idx="0">
+              <a:schemeClr val="accent1"/>
+            </a:effectRef>
+            <a:fontRef idx="minor">
+              <a:schemeClr val="lt1"/>
+            </a:fontRef>
+          </p:style>
+          <p:txBody>
+            <a:bodyPr rtlCol="0" anchor="ctr"/>
+            <a:lstStyle/>
+            <a:p>
+              <a:pPr algn="ctr"/>
+              <a:endParaRPr lang="de-DE"/>
+            </a:p>
+          </p:txBody>
+        </p:sp>
+        <p:sp>
+          <p:nvSpPr>
+            <p:cNvPr id="6" name="Rechteck 5"/>
+            <p:cNvSpPr/>
+            <p:nvPr/>
+          </p:nvSpPr>
+          <p:spPr>
+            <a:xfrm>
+              <a:off x="1686271" y="1703561"/>
+              <a:ext cx="178247" cy="360983"/>
+            </a:xfrm>
+            <a:prstGeom prst="rect">
+              <a:avLst/>
+            </a:prstGeom>
+            <a:noFill/>
+            <a:ln w="9525">
+              <a:solidFill>
+                <a:srgbClr val="00FF00"/>
+              </a:solidFill>
+            </a:ln>
+          </p:spPr>
+          <p:style>
+            <a:lnRef idx="2">
+              <a:schemeClr val="accent1">
+                <a:shade val="50000"/>
+              </a:schemeClr>
+            </a:lnRef>
+            <a:fillRef idx="1">
+              <a:schemeClr val="accent1"/>
+            </a:fillRef>
+            <a:effectRef idx="0">
+              <a:schemeClr val="accent1"/>
+            </a:effectRef>
+            <a:fontRef idx="minor">
+              <a:schemeClr val="lt1"/>
+            </a:fontRef>
+          </p:style>
+          <p:txBody>
+            <a:bodyPr rtlCol="0" anchor="ctr"/>
+            <a:lstStyle/>
+            <a:p>
+              <a:pPr algn="ctr"/>
+              <a:endParaRPr lang="de-DE"/>
+            </a:p>
+          </p:txBody>
+        </p:sp>
+        <p:sp>
+          <p:nvSpPr>
+            <p:cNvPr id="8" name="Rechteck 7"/>
+            <p:cNvSpPr/>
+            <p:nvPr/>
+          </p:nvSpPr>
+          <p:spPr>
+            <a:xfrm>
+              <a:off x="2543174" y="1309688"/>
+              <a:ext cx="154782" cy="157162"/>
+            </a:xfrm>
+            <a:prstGeom prst="rect">
+              <a:avLst/>
+            </a:prstGeom>
+            <a:noFill/>
+            <a:ln w="9525">
+              <a:solidFill>
+                <a:srgbClr val="00FF00"/>
+              </a:solidFill>
+            </a:ln>
+          </p:spPr>
+          <p:style>
+            <a:lnRef idx="2">
+              <a:schemeClr val="accent1">
+                <a:shade val="50000"/>
+              </a:schemeClr>
+            </a:lnRef>
+            <a:fillRef idx="1">
+              <a:schemeClr val="accent1"/>
+            </a:fillRef>
+            <a:effectRef idx="0">
+              <a:schemeClr val="accent1"/>
+            </a:effectRef>
+            <a:fontRef idx="minor">
+              <a:schemeClr val="lt1"/>
+            </a:fontRef>
+          </p:style>
+          <p:txBody>
+            <a:bodyPr rtlCol="0" anchor="ctr"/>
+            <a:lstStyle/>
+            <a:p>
+              <a:pPr algn="ctr"/>
+              <a:endParaRPr lang="de-DE"/>
+            </a:p>
+          </p:txBody>
+        </p:sp>
+        <p:sp>
+          <p:nvSpPr>
+            <p:cNvPr id="9" name="Rechteck 8"/>
+            <p:cNvSpPr/>
+            <p:nvPr/>
+          </p:nvSpPr>
+          <p:spPr>
+            <a:xfrm>
+              <a:off x="1871660" y="528638"/>
+              <a:ext cx="981075" cy="619126"/>
+            </a:xfrm>
+            <a:prstGeom prst="rect">
+              <a:avLst/>
+            </a:prstGeom>
+            <a:noFill/>
+            <a:ln w="9525">
+              <a:solidFill>
+                <a:srgbClr val="00FF00"/>
+              </a:solidFill>
+            </a:ln>
+          </p:spPr>
+          <p:style>
+            <a:lnRef idx="2">
+              <a:schemeClr val="accent1">
+                <a:shade val="50000"/>
+              </a:schemeClr>
+            </a:lnRef>
+            <a:fillRef idx="1">
+              <a:schemeClr val="accent1"/>
+            </a:fillRef>
+            <a:effectRef idx="0">
+              <a:schemeClr val="accent1"/>
+            </a:effectRef>
+            <a:fontRef idx="minor">
+              <a:schemeClr val="lt1"/>
+            </a:fontRef>
+          </p:style>
+          <p:txBody>
+            <a:bodyPr rtlCol="0" anchor="ctr"/>
+            <a:lstStyle/>
+            <a:p>
+              <a:pPr algn="ctr"/>
+              <a:endParaRPr lang="de-DE"/>
+            </a:p>
+          </p:txBody>
+        </p:sp>
+        <p:sp>
+          <p:nvSpPr>
+            <p:cNvPr id="3" name="Textfeld 2"/>
+            <p:cNvSpPr txBox="1"/>
+            <p:nvPr/>
+          </p:nvSpPr>
+          <p:spPr>
+            <a:xfrm>
+              <a:off x="163344" y="1259907"/>
+              <a:ext cx="360040" cy="138499"/>
+            </a:xfrm>
+            <a:prstGeom prst="rect">
+              <a:avLst/>
+            </a:prstGeom>
+            <a:noFill/>
+            <a:effectLst>
+              <a:outerShdw blurRad="10160" dist="3810" dir="3600000" algn="t" rotWithShape="0">
+                <a:schemeClr val="tx1"/>
+              </a:outerShdw>
+            </a:effectLst>
+          </p:spPr>
+          <p:txBody>
+            <a:bodyPr wrap="square" lIns="0" tIns="0" rIns="0" bIns="0" rtlCol="0">
+              <a:spAutoFit/>
+            </a:bodyPr>
+            <a:lstStyle/>
+            <a:p>
+              <a:r>
+                <a:rPr lang="de-DE" b="1" dirty="0" err="1" smtClean="0">
+                  <a:solidFill>
+                    <a:srgbClr val="60FF3B"/>
+                  </a:solidFill>
+                  <a:latin typeface="cmr10" panose="020B0500000000000000" pitchFamily="34" charset="0"/>
+                </a:rPr>
+                <a:t>tchibo</a:t>
+              </a:r>
+              <a:endParaRPr lang="de-DE" b="1" dirty="0">
+                <a:solidFill>
+                  <a:srgbClr val="60FF3B"/>
+                </a:solidFill>
+                <a:latin typeface="cmr10" panose="020B0500000000000000" pitchFamily="34" charset="0"/>
+              </a:endParaRPr>
+            </a:p>
+          </p:txBody>
+        </p:sp>
+        <p:sp>
+          <p:nvSpPr>
+            <p:cNvPr id="10" name="Textfeld 9"/>
+            <p:cNvSpPr txBox="1"/>
+            <p:nvPr/>
+          </p:nvSpPr>
+          <p:spPr>
+            <a:xfrm>
+              <a:off x="626345" y="1478460"/>
+              <a:ext cx="576064" cy="276999"/>
+            </a:xfrm>
+            <a:prstGeom prst="rect">
+              <a:avLst/>
+            </a:prstGeom>
+            <a:noFill/>
+            <a:effectLst>
+              <a:outerShdw blurRad="10160" dist="3810" dir="3600000" algn="t" rotWithShape="0">
+                <a:schemeClr val="tx1"/>
+              </a:outerShdw>
+            </a:effectLst>
+          </p:spPr>
+          <p:txBody>
+            <a:bodyPr wrap="square" lIns="0" tIns="0" rIns="0" bIns="0" rtlCol="0">
+              <a:spAutoFit/>
+            </a:bodyPr>
+            <a:lstStyle/>
+            <a:p>
+              <a:pPr algn="ctr"/>
+              <a:r>
+                <a:rPr lang="de-DE" b="1" dirty="0" err="1" smtClean="0">
+                  <a:solidFill>
+                    <a:srgbClr val="60FF3B"/>
+                  </a:solidFill>
+                  <a:latin typeface="cmr10" panose="020B0500000000000000" pitchFamily="34" charset="0"/>
+                </a:rPr>
+                <a:t>starbucks</a:t>
+              </a:r>
+              <a:r>
+                <a:rPr lang="de-DE" b="1" dirty="0" smtClean="0">
+                  <a:solidFill>
+                    <a:srgbClr val="60FF3B"/>
+                  </a:solidFill>
+                  <a:latin typeface="cmr10" panose="020B0500000000000000" pitchFamily="34" charset="0"/>
+                </a:rPr>
+                <a:t>-symbol</a:t>
+              </a:r>
+              <a:endParaRPr lang="de-DE" b="1" dirty="0">
+                <a:solidFill>
+                  <a:srgbClr val="60FF3B"/>
+                </a:solidFill>
+                <a:latin typeface="cmr10" panose="020B0500000000000000" pitchFamily="34" charset="0"/>
+              </a:endParaRPr>
+            </a:p>
+          </p:txBody>
+        </p:sp>
+        <p:sp>
+          <p:nvSpPr>
+            <p:cNvPr id="11" name="Textfeld 10"/>
+            <p:cNvSpPr txBox="1"/>
+            <p:nvPr/>
+          </p:nvSpPr>
+          <p:spPr>
+            <a:xfrm>
+              <a:off x="1914518" y="1742804"/>
+              <a:ext cx="660227" cy="276999"/>
+            </a:xfrm>
+            <a:prstGeom prst="rect">
+              <a:avLst/>
+            </a:prstGeom>
+            <a:noFill/>
+            <a:effectLst>
+              <a:outerShdw blurRad="10160" dist="3810" dir="3600000" algn="t" rotWithShape="0">
+                <a:schemeClr val="tx1"/>
+              </a:outerShdw>
+            </a:effectLst>
+          </p:spPr>
+          <p:txBody>
+            <a:bodyPr wrap="square" lIns="0" tIns="0" rIns="0" bIns="0" rtlCol="0">
+              <a:spAutoFit/>
+            </a:bodyPr>
+            <a:lstStyle/>
+            <a:p>
+              <a:r>
+                <a:rPr lang="de-DE" b="1" dirty="0" err="1" smtClean="0">
+                  <a:solidFill>
+                    <a:srgbClr val="60FF3B"/>
+                  </a:solidFill>
+                  <a:latin typeface="cmr10" panose="020B0500000000000000" pitchFamily="34" charset="0"/>
+                </a:rPr>
+                <a:t>starbucks</a:t>
+              </a:r>
+              <a:r>
+                <a:rPr lang="de-DE" b="1" dirty="0" smtClean="0">
+                  <a:solidFill>
+                    <a:srgbClr val="60FF3B"/>
+                  </a:solidFill>
+                  <a:latin typeface="cmr10" panose="020B0500000000000000" pitchFamily="34" charset="0"/>
+                </a:rPr>
+                <a:t>-symbol</a:t>
+              </a:r>
+              <a:endParaRPr lang="de-DE" b="1" dirty="0">
+                <a:solidFill>
+                  <a:srgbClr val="60FF3B"/>
+                </a:solidFill>
+                <a:latin typeface="cmr10" panose="020B0500000000000000" pitchFamily="34" charset="0"/>
+              </a:endParaRPr>
+            </a:p>
+          </p:txBody>
+        </p:sp>
+        <p:sp>
+          <p:nvSpPr>
+            <p:cNvPr id="14" name="Ellipse 13"/>
+            <p:cNvSpPr/>
+            <p:nvPr/>
+          </p:nvSpPr>
+          <p:spPr>
+            <a:xfrm>
+              <a:off x="742950" y="1062038"/>
+              <a:ext cx="45719" cy="45719"/>
+            </a:xfrm>
+            <a:prstGeom prst="ellipse">
+              <a:avLst/>
+            </a:prstGeom>
+            <a:solidFill>
+              <a:srgbClr val="00FF00"/>
+            </a:solidFill>
+            <a:ln>
+              <a:noFill/>
+            </a:ln>
+          </p:spPr>
+          <p:style>
+            <a:lnRef idx="2">
+              <a:schemeClr val="accent1">
+                <a:shade val="50000"/>
+              </a:schemeClr>
+            </a:lnRef>
+            <a:fillRef idx="1">
+              <a:schemeClr val="accent1"/>
+            </a:fillRef>
+            <a:effectRef idx="0">
+              <a:schemeClr val="accent1"/>
+            </a:effectRef>
+            <a:fontRef idx="minor">
+              <a:schemeClr val="lt1"/>
+            </a:fontRef>
+          </p:style>
+          <p:txBody>
+            <a:bodyPr rtlCol="0" anchor="ctr"/>
+            <a:lstStyle/>
+            <a:p>
+              <a:pPr algn="ctr"/>
+              <a:endParaRPr lang="de-DE"/>
+            </a:p>
+          </p:txBody>
+        </p:sp>
+        <p:sp>
+          <p:nvSpPr>
+            <p:cNvPr id="15" name="Ellipse 14"/>
+            <p:cNvSpPr/>
+            <p:nvPr/>
+          </p:nvSpPr>
+          <p:spPr>
+            <a:xfrm>
+              <a:off x="1014316" y="1062038"/>
+              <a:ext cx="45719" cy="45719"/>
+            </a:xfrm>
+            <a:prstGeom prst="ellipse">
+              <a:avLst/>
+            </a:prstGeom>
+            <a:solidFill>
+              <a:srgbClr val="00FF00"/>
+            </a:solidFill>
+            <a:ln>
+              <a:noFill/>
+            </a:ln>
+          </p:spPr>
+          <p:style>
+            <a:lnRef idx="2">
+              <a:schemeClr val="accent1">
+                <a:shade val="50000"/>
+              </a:schemeClr>
+            </a:lnRef>
+            <a:fillRef idx="1">
+              <a:schemeClr val="accent1"/>
+            </a:fillRef>
+            <a:effectRef idx="0">
+              <a:schemeClr val="accent1"/>
+            </a:effectRef>
+            <a:fontRef idx="minor">
+              <a:schemeClr val="lt1"/>
+            </a:fontRef>
+          </p:style>
+          <p:txBody>
+            <a:bodyPr rtlCol="0" anchor="ctr"/>
+            <a:lstStyle/>
+            <a:p>
+              <a:pPr algn="ctr"/>
+              <a:endParaRPr lang="de-DE"/>
+            </a:p>
+          </p:txBody>
+        </p:sp>
+        <p:sp>
+          <p:nvSpPr>
+            <p:cNvPr id="16" name="Ellipse 15"/>
+            <p:cNvSpPr/>
+            <p:nvPr/>
+          </p:nvSpPr>
+          <p:spPr>
+            <a:xfrm>
+              <a:off x="1014316" y="1423819"/>
+              <a:ext cx="45719" cy="45719"/>
+            </a:xfrm>
+            <a:prstGeom prst="ellipse">
+              <a:avLst/>
+            </a:prstGeom>
+            <a:solidFill>
+              <a:srgbClr val="00FF00"/>
+            </a:solidFill>
+            <a:ln>
+              <a:noFill/>
+            </a:ln>
+          </p:spPr>
+          <p:style>
+            <a:lnRef idx="2">
+              <a:schemeClr val="accent1">
+                <a:shade val="50000"/>
+              </a:schemeClr>
+            </a:lnRef>
+            <a:fillRef idx="1">
+              <a:schemeClr val="accent1"/>
+            </a:fillRef>
+            <a:effectRef idx="0">
+              <a:schemeClr val="accent1"/>
+            </a:effectRef>
+            <a:fontRef idx="minor">
+              <a:schemeClr val="lt1"/>
+            </a:fontRef>
+          </p:style>
+          <p:txBody>
+            <a:bodyPr rtlCol="0" anchor="ctr"/>
+            <a:lstStyle/>
+            <a:p>
+              <a:pPr algn="ctr"/>
+              <a:endParaRPr lang="de-DE"/>
+            </a:p>
+          </p:txBody>
+        </p:sp>
+        <p:sp>
+          <p:nvSpPr>
+            <p:cNvPr id="17" name="Ellipse 16"/>
+            <p:cNvSpPr/>
+            <p:nvPr/>
+          </p:nvSpPr>
+          <p:spPr>
+            <a:xfrm>
+              <a:off x="743901" y="1423819"/>
+              <a:ext cx="45719" cy="45719"/>
+            </a:xfrm>
+            <a:prstGeom prst="ellipse">
+              <a:avLst/>
+            </a:prstGeom>
+            <a:solidFill>
+              <a:srgbClr val="00FF00"/>
+            </a:solidFill>
+            <a:ln>
+              <a:noFill/>
+            </a:ln>
+          </p:spPr>
+          <p:style>
+            <a:lnRef idx="2">
+              <a:schemeClr val="accent1">
+                <a:shade val="50000"/>
+              </a:schemeClr>
+            </a:lnRef>
+            <a:fillRef idx="1">
+              <a:schemeClr val="accent1"/>
+            </a:fillRef>
+            <a:effectRef idx="0">
+              <a:schemeClr val="accent1"/>
+            </a:effectRef>
+            <a:fontRef idx="minor">
+              <a:schemeClr val="lt1"/>
+            </a:fontRef>
+          </p:style>
+          <p:txBody>
+            <a:bodyPr rtlCol="0" anchor="ctr"/>
+            <a:lstStyle/>
+            <a:p>
+              <a:pPr algn="ctr"/>
+              <a:endParaRPr lang="de-DE"/>
+            </a:p>
+          </p:txBody>
+        </p:sp>
+        <p:sp>
+          <p:nvSpPr>
+            <p:cNvPr id="18" name="Ellipse 17"/>
+            <p:cNvSpPr/>
+            <p:nvPr/>
+          </p:nvSpPr>
+          <p:spPr>
+            <a:xfrm>
+              <a:off x="100964" y="1382690"/>
+              <a:ext cx="45719" cy="45719"/>
+            </a:xfrm>
+            <a:prstGeom prst="ellipse">
+              <a:avLst/>
+            </a:prstGeom>
+            <a:solidFill>
+              <a:srgbClr val="00FF00"/>
+            </a:solidFill>
+            <a:ln>
+              <a:noFill/>
+            </a:ln>
+          </p:spPr>
+          <p:style>
+            <a:lnRef idx="2">
+              <a:schemeClr val="accent1">
+                <a:shade val="50000"/>
+              </a:schemeClr>
+            </a:lnRef>
+            <a:fillRef idx="1">
+              <a:schemeClr val="accent1"/>
+            </a:fillRef>
+            <a:effectRef idx="0">
+              <a:schemeClr val="accent1"/>
+            </a:effectRef>
+            <a:fontRef idx="minor">
+              <a:schemeClr val="lt1"/>
+            </a:fontRef>
+          </p:style>
+          <p:txBody>
+            <a:bodyPr rtlCol="0" anchor="ctr"/>
+            <a:lstStyle/>
+            <a:p>
+              <a:pPr algn="ctr"/>
+              <a:endParaRPr lang="de-DE"/>
+            </a:p>
+          </p:txBody>
+        </p:sp>
+        <p:sp>
+          <p:nvSpPr>
+            <p:cNvPr id="19" name="Ellipse 18"/>
+            <p:cNvSpPr/>
+            <p:nvPr/>
+          </p:nvSpPr>
+          <p:spPr>
+            <a:xfrm>
+              <a:off x="100964" y="1232059"/>
+              <a:ext cx="45719" cy="45719"/>
+            </a:xfrm>
+            <a:prstGeom prst="ellipse">
+              <a:avLst/>
+            </a:prstGeom>
+            <a:solidFill>
+              <a:srgbClr val="00FF00"/>
+            </a:solidFill>
+            <a:ln>
+              <a:noFill/>
+            </a:ln>
+          </p:spPr>
+          <p:style>
+            <a:lnRef idx="2">
+              <a:schemeClr val="accent1">
+                <a:shade val="50000"/>
+              </a:schemeClr>
+            </a:lnRef>
+            <a:fillRef idx="1">
+              <a:schemeClr val="accent1"/>
+            </a:fillRef>
+            <a:effectRef idx="0">
+              <a:schemeClr val="accent1"/>
+            </a:effectRef>
+            <a:fontRef idx="minor">
+              <a:schemeClr val="lt1"/>
+            </a:fontRef>
+          </p:style>
+          <p:txBody>
+            <a:bodyPr rtlCol="0" anchor="ctr"/>
+            <a:lstStyle/>
+            <a:p>
+              <a:pPr algn="ctr"/>
+              <a:endParaRPr lang="de-DE"/>
+            </a:p>
+          </p:txBody>
+        </p:sp>
+        <p:sp>
+          <p:nvSpPr>
+            <p:cNvPr id="20" name="Ellipse 19"/>
+            <p:cNvSpPr/>
+            <p:nvPr/>
+          </p:nvSpPr>
+          <p:spPr>
+            <a:xfrm>
+              <a:off x="951" y="1232059"/>
+              <a:ext cx="45719" cy="45719"/>
+            </a:xfrm>
+            <a:prstGeom prst="ellipse">
+              <a:avLst/>
+            </a:prstGeom>
+            <a:solidFill>
+              <a:srgbClr val="00FF00"/>
+            </a:solidFill>
+            <a:ln>
+              <a:noFill/>
+            </a:ln>
+          </p:spPr>
+          <p:style>
+            <a:lnRef idx="2">
+              <a:schemeClr val="accent1">
+                <a:shade val="50000"/>
+              </a:schemeClr>
+            </a:lnRef>
+            <a:fillRef idx="1">
+              <a:schemeClr val="accent1"/>
+            </a:fillRef>
+            <a:effectRef idx="0">
+              <a:schemeClr val="accent1"/>
+            </a:effectRef>
+            <a:fontRef idx="minor">
+              <a:schemeClr val="lt1"/>
+            </a:fontRef>
+          </p:style>
+          <p:txBody>
+            <a:bodyPr rtlCol="0" anchor="ctr"/>
+            <a:lstStyle/>
+            <a:p>
+              <a:pPr algn="ctr"/>
+              <a:endParaRPr lang="de-DE"/>
+            </a:p>
+          </p:txBody>
+        </p:sp>
+        <p:sp>
+          <p:nvSpPr>
+            <p:cNvPr id="21" name="Ellipse 20"/>
+            <p:cNvSpPr/>
+            <p:nvPr/>
+          </p:nvSpPr>
+          <p:spPr>
+            <a:xfrm>
+              <a:off x="951" y="1378100"/>
+              <a:ext cx="45719" cy="45719"/>
+            </a:xfrm>
+            <a:prstGeom prst="ellipse">
+              <a:avLst/>
+            </a:prstGeom>
+            <a:solidFill>
+              <a:srgbClr val="00FF00"/>
+            </a:solidFill>
+            <a:ln>
+              <a:noFill/>
+            </a:ln>
+          </p:spPr>
+          <p:style>
+            <a:lnRef idx="2">
+              <a:schemeClr val="accent1">
+                <a:shade val="50000"/>
+              </a:schemeClr>
+            </a:lnRef>
+            <a:fillRef idx="1">
+              <a:schemeClr val="accent1"/>
+            </a:fillRef>
+            <a:effectRef idx="0">
+              <a:schemeClr val="accent1"/>
+            </a:effectRef>
+            <a:fontRef idx="minor">
+              <a:schemeClr val="lt1"/>
+            </a:fontRef>
+          </p:style>
+          <p:txBody>
+            <a:bodyPr rtlCol="0" anchor="ctr"/>
+            <a:lstStyle/>
+            <a:p>
+              <a:pPr algn="ctr"/>
+              <a:endParaRPr lang="de-DE"/>
+            </a:p>
+          </p:txBody>
+        </p:sp>
+        <p:sp>
+          <p:nvSpPr>
+            <p:cNvPr id="22" name="Ellipse 21"/>
+            <p:cNvSpPr/>
+            <p:nvPr/>
+          </p:nvSpPr>
+          <p:spPr>
+            <a:xfrm>
+              <a:off x="1849325" y="1124904"/>
+              <a:ext cx="45719" cy="45719"/>
+            </a:xfrm>
+            <a:prstGeom prst="ellipse">
+              <a:avLst/>
+            </a:prstGeom>
+            <a:solidFill>
+              <a:srgbClr val="00FF00"/>
+            </a:solidFill>
+            <a:ln>
+              <a:noFill/>
+            </a:ln>
+          </p:spPr>
+          <p:style>
+            <a:lnRef idx="2">
+              <a:schemeClr val="accent1">
+                <a:shade val="50000"/>
+              </a:schemeClr>
+            </a:lnRef>
+            <a:fillRef idx="1">
+              <a:schemeClr val="accent1"/>
+            </a:fillRef>
+            <a:effectRef idx="0">
+              <a:schemeClr val="accent1"/>
+            </a:effectRef>
+            <a:fontRef idx="minor">
+              <a:schemeClr val="lt1"/>
+            </a:fontRef>
+          </p:style>
+          <p:txBody>
+            <a:bodyPr rtlCol="0" anchor="ctr"/>
+            <a:lstStyle/>
+            <a:p>
+              <a:pPr algn="ctr"/>
+              <a:endParaRPr lang="de-DE"/>
+            </a:p>
+          </p:txBody>
+        </p:sp>
+        <p:sp>
+          <p:nvSpPr>
+            <p:cNvPr id="23" name="Ellipse 22"/>
+            <p:cNvSpPr/>
+            <p:nvPr/>
+          </p:nvSpPr>
+          <p:spPr>
+            <a:xfrm>
+              <a:off x="1849325" y="505778"/>
+              <a:ext cx="45719" cy="45719"/>
+            </a:xfrm>
+            <a:prstGeom prst="ellipse">
+              <a:avLst/>
+            </a:prstGeom>
+            <a:solidFill>
+              <a:srgbClr val="00FF00"/>
+            </a:solidFill>
+            <a:ln>
+              <a:noFill/>
+            </a:ln>
+          </p:spPr>
+          <p:style>
+            <a:lnRef idx="2">
+              <a:schemeClr val="accent1">
+                <a:shade val="50000"/>
+              </a:schemeClr>
+            </a:lnRef>
+            <a:fillRef idx="1">
+              <a:schemeClr val="accent1"/>
+            </a:fillRef>
+            <a:effectRef idx="0">
+              <a:schemeClr val="accent1"/>
+            </a:effectRef>
+            <a:fontRef idx="minor">
+              <a:schemeClr val="lt1"/>
+            </a:fontRef>
+          </p:style>
+          <p:txBody>
+            <a:bodyPr rtlCol="0" anchor="ctr"/>
+            <a:lstStyle/>
+            <a:p>
+              <a:pPr algn="ctr"/>
+              <a:endParaRPr lang="de-DE"/>
+            </a:p>
+          </p:txBody>
+        </p:sp>
+        <p:sp>
+          <p:nvSpPr>
+            <p:cNvPr id="24" name="Ellipse 23"/>
+            <p:cNvSpPr/>
+            <p:nvPr/>
+          </p:nvSpPr>
+          <p:spPr>
+            <a:xfrm>
+              <a:off x="2827494" y="505778"/>
+              <a:ext cx="45719" cy="45719"/>
+            </a:xfrm>
+            <a:prstGeom prst="ellipse">
+              <a:avLst/>
+            </a:prstGeom>
+            <a:solidFill>
+              <a:srgbClr val="00FF00"/>
+            </a:solidFill>
+            <a:ln>
+              <a:noFill/>
+            </a:ln>
+          </p:spPr>
+          <p:style>
+            <a:lnRef idx="2">
+              <a:schemeClr val="accent1">
+                <a:shade val="50000"/>
+              </a:schemeClr>
+            </a:lnRef>
+            <a:fillRef idx="1">
+              <a:schemeClr val="accent1"/>
+            </a:fillRef>
+            <a:effectRef idx="0">
+              <a:schemeClr val="accent1"/>
+            </a:effectRef>
+            <a:fontRef idx="minor">
+              <a:schemeClr val="lt1"/>
+            </a:fontRef>
+          </p:style>
+          <p:txBody>
+            <a:bodyPr rtlCol="0" anchor="ctr"/>
+            <a:lstStyle/>
+            <a:p>
+              <a:pPr algn="ctr"/>
+              <a:endParaRPr lang="de-DE"/>
+            </a:p>
+          </p:txBody>
+        </p:sp>
+        <p:sp>
+          <p:nvSpPr>
+            <p:cNvPr id="25" name="Ellipse 24"/>
+            <p:cNvSpPr/>
+            <p:nvPr/>
+          </p:nvSpPr>
+          <p:spPr>
+            <a:xfrm>
+              <a:off x="2827494" y="1124904"/>
+              <a:ext cx="45719" cy="45719"/>
+            </a:xfrm>
+            <a:prstGeom prst="ellipse">
+              <a:avLst/>
+            </a:prstGeom>
+            <a:solidFill>
+              <a:srgbClr val="00FF00"/>
+            </a:solidFill>
+            <a:ln>
+              <a:noFill/>
+            </a:ln>
+          </p:spPr>
+          <p:style>
+            <a:lnRef idx="2">
+              <a:schemeClr val="accent1">
+                <a:shade val="50000"/>
+              </a:schemeClr>
+            </a:lnRef>
+            <a:fillRef idx="1">
+              <a:schemeClr val="accent1"/>
+            </a:fillRef>
+            <a:effectRef idx="0">
+              <a:schemeClr val="accent1"/>
+            </a:effectRef>
+            <a:fontRef idx="minor">
+              <a:schemeClr val="lt1"/>
+            </a:fontRef>
+          </p:style>
+          <p:txBody>
+            <a:bodyPr rtlCol="0" anchor="ctr"/>
+            <a:lstStyle/>
+            <a:p>
+              <a:pPr algn="ctr"/>
+              <a:endParaRPr lang="de-DE"/>
+            </a:p>
+          </p:txBody>
+        </p:sp>
+        <p:sp>
+          <p:nvSpPr>
+            <p:cNvPr id="26" name="Ellipse 25"/>
+            <p:cNvSpPr/>
+            <p:nvPr/>
+          </p:nvSpPr>
+          <p:spPr>
+            <a:xfrm>
+              <a:off x="2675094" y="1284448"/>
+              <a:ext cx="45719" cy="45719"/>
+            </a:xfrm>
+            <a:prstGeom prst="ellipse">
+              <a:avLst/>
+            </a:prstGeom>
+            <a:solidFill>
+              <a:srgbClr val="00FF00"/>
+            </a:solidFill>
+            <a:ln>
+              <a:noFill/>
+            </a:ln>
+          </p:spPr>
+          <p:style>
+            <a:lnRef idx="2">
+              <a:schemeClr val="accent1">
+                <a:shade val="50000"/>
+              </a:schemeClr>
+            </a:lnRef>
+            <a:fillRef idx="1">
+              <a:schemeClr val="accent1"/>
+            </a:fillRef>
+            <a:effectRef idx="0">
+              <a:schemeClr val="accent1"/>
+            </a:effectRef>
+            <a:fontRef idx="minor">
+              <a:schemeClr val="lt1"/>
+            </a:fontRef>
+          </p:style>
+          <p:txBody>
+            <a:bodyPr rtlCol="0" anchor="ctr"/>
+            <a:lstStyle/>
+            <a:p>
+              <a:pPr algn="ctr"/>
+              <a:endParaRPr lang="de-DE"/>
+            </a:p>
+          </p:txBody>
+        </p:sp>
+        <p:sp>
+          <p:nvSpPr>
+            <p:cNvPr id="27" name="Ellipse 26"/>
+            <p:cNvSpPr/>
+            <p:nvPr/>
+          </p:nvSpPr>
+          <p:spPr>
+            <a:xfrm>
+              <a:off x="2675094" y="1441916"/>
+              <a:ext cx="45719" cy="45719"/>
+            </a:xfrm>
+            <a:prstGeom prst="ellipse">
+              <a:avLst/>
+            </a:prstGeom>
+            <a:solidFill>
+              <a:srgbClr val="00FF00"/>
+            </a:solidFill>
+            <a:ln>
+              <a:noFill/>
+            </a:ln>
+          </p:spPr>
+          <p:style>
+            <a:lnRef idx="2">
+              <a:schemeClr val="accent1">
+                <a:shade val="50000"/>
+              </a:schemeClr>
+            </a:lnRef>
+            <a:fillRef idx="1">
+              <a:schemeClr val="accent1"/>
+            </a:fillRef>
+            <a:effectRef idx="0">
+              <a:schemeClr val="accent1"/>
+            </a:effectRef>
+            <a:fontRef idx="minor">
+              <a:schemeClr val="lt1"/>
+            </a:fontRef>
+          </p:style>
+          <p:txBody>
+            <a:bodyPr rtlCol="0" anchor="ctr"/>
+            <a:lstStyle/>
+            <a:p>
+              <a:pPr algn="ctr"/>
+              <a:endParaRPr lang="de-DE"/>
+            </a:p>
+          </p:txBody>
+        </p:sp>
+        <p:sp>
+          <p:nvSpPr>
+            <p:cNvPr id="28" name="Ellipse 27"/>
+            <p:cNvSpPr/>
+            <p:nvPr/>
+          </p:nvSpPr>
+          <p:spPr>
+            <a:xfrm>
+              <a:off x="2520314" y="1441916"/>
+              <a:ext cx="45719" cy="45719"/>
+            </a:xfrm>
+            <a:prstGeom prst="ellipse">
+              <a:avLst/>
+            </a:prstGeom>
+            <a:solidFill>
+              <a:srgbClr val="00FF00"/>
+            </a:solidFill>
+            <a:ln>
+              <a:noFill/>
+            </a:ln>
+          </p:spPr>
+          <p:style>
+            <a:lnRef idx="2">
+              <a:schemeClr val="accent1">
+                <a:shade val="50000"/>
+              </a:schemeClr>
+            </a:lnRef>
+            <a:fillRef idx="1">
+              <a:schemeClr val="accent1"/>
+            </a:fillRef>
+            <a:effectRef idx="0">
+              <a:schemeClr val="accent1"/>
+            </a:effectRef>
+            <a:fontRef idx="minor">
+              <a:schemeClr val="lt1"/>
+            </a:fontRef>
+          </p:style>
+          <p:txBody>
+            <a:bodyPr rtlCol="0" anchor="ctr"/>
+            <a:lstStyle/>
+            <a:p>
+              <a:pPr algn="ctr"/>
+              <a:endParaRPr lang="de-DE"/>
+            </a:p>
+          </p:txBody>
+        </p:sp>
+        <p:sp>
+          <p:nvSpPr>
+            <p:cNvPr id="29" name="Ellipse 28"/>
+            <p:cNvSpPr/>
+            <p:nvPr/>
+          </p:nvSpPr>
+          <p:spPr>
+            <a:xfrm>
+              <a:off x="2520314" y="1284448"/>
+              <a:ext cx="45719" cy="45719"/>
+            </a:xfrm>
+            <a:prstGeom prst="ellipse">
+              <a:avLst/>
+            </a:prstGeom>
+            <a:solidFill>
+              <a:srgbClr val="00FF00"/>
+            </a:solidFill>
+            <a:ln>
+              <a:noFill/>
+            </a:ln>
+          </p:spPr>
+          <p:style>
+            <a:lnRef idx="2">
+              <a:schemeClr val="accent1">
+                <a:shade val="50000"/>
+              </a:schemeClr>
+            </a:lnRef>
+            <a:fillRef idx="1">
+              <a:schemeClr val="accent1"/>
+            </a:fillRef>
+            <a:effectRef idx="0">
+              <a:schemeClr val="accent1"/>
+            </a:effectRef>
+            <a:fontRef idx="minor">
+              <a:schemeClr val="lt1"/>
+            </a:fontRef>
+          </p:style>
+          <p:txBody>
+            <a:bodyPr rtlCol="0" anchor="ctr"/>
+            <a:lstStyle/>
+            <a:p>
+              <a:pPr algn="ctr"/>
+              <a:endParaRPr lang="de-DE"/>
+            </a:p>
+          </p:txBody>
+        </p:sp>
+        <p:sp>
+          <p:nvSpPr>
+            <p:cNvPr id="30" name="Ellipse 29"/>
+            <p:cNvSpPr/>
+            <p:nvPr/>
+          </p:nvSpPr>
+          <p:spPr>
+            <a:xfrm>
+              <a:off x="1663411" y="1680701"/>
+              <a:ext cx="45719" cy="45719"/>
+            </a:xfrm>
+            <a:prstGeom prst="ellipse">
+              <a:avLst/>
+            </a:prstGeom>
+            <a:solidFill>
+              <a:srgbClr val="00FF00"/>
+            </a:solidFill>
+            <a:ln>
+              <a:noFill/>
+            </a:ln>
+          </p:spPr>
+          <p:style>
+            <a:lnRef idx="2">
+              <a:schemeClr val="accent1">
+                <a:shade val="50000"/>
+              </a:schemeClr>
+            </a:lnRef>
+            <a:fillRef idx="1">
+              <a:schemeClr val="accent1"/>
+            </a:fillRef>
+            <a:effectRef idx="0">
+              <a:schemeClr val="accent1"/>
+            </a:effectRef>
+            <a:fontRef idx="minor">
+              <a:schemeClr val="lt1"/>
+            </a:fontRef>
+          </p:style>
+          <p:txBody>
+            <a:bodyPr rtlCol="0" anchor="ctr"/>
+            <a:lstStyle/>
+            <a:p>
+              <a:pPr algn="ctr"/>
+              <a:endParaRPr lang="de-DE"/>
+            </a:p>
+          </p:txBody>
+        </p:sp>
+        <p:sp>
+          <p:nvSpPr>
+            <p:cNvPr id="31" name="Ellipse 30"/>
+            <p:cNvSpPr/>
+            <p:nvPr/>
+          </p:nvSpPr>
+          <p:spPr>
+            <a:xfrm>
+              <a:off x="1841658" y="1680701"/>
+              <a:ext cx="45719" cy="45719"/>
+            </a:xfrm>
+            <a:prstGeom prst="ellipse">
+              <a:avLst/>
+            </a:prstGeom>
+            <a:solidFill>
+              <a:srgbClr val="00FF00"/>
+            </a:solidFill>
+            <a:ln>
+              <a:noFill/>
+            </a:ln>
+          </p:spPr>
+          <p:style>
+            <a:lnRef idx="2">
+              <a:schemeClr val="accent1">
+                <a:shade val="50000"/>
+              </a:schemeClr>
+            </a:lnRef>
+            <a:fillRef idx="1">
+              <a:schemeClr val="accent1"/>
+            </a:fillRef>
+            <a:effectRef idx="0">
+              <a:schemeClr val="accent1"/>
+            </a:effectRef>
+            <a:fontRef idx="minor">
+              <a:schemeClr val="lt1"/>
+            </a:fontRef>
+          </p:style>
+          <p:txBody>
+            <a:bodyPr rtlCol="0" anchor="ctr"/>
+            <a:lstStyle/>
+            <a:p>
+              <a:pPr algn="ctr"/>
+              <a:endParaRPr lang="de-DE"/>
+            </a:p>
+          </p:txBody>
+        </p:sp>
+        <p:sp>
+          <p:nvSpPr>
+            <p:cNvPr id="32" name="Ellipse 31"/>
+            <p:cNvSpPr/>
+            <p:nvPr/>
+          </p:nvSpPr>
+          <p:spPr>
+            <a:xfrm>
+              <a:off x="1841658" y="2041684"/>
+              <a:ext cx="45719" cy="45719"/>
+            </a:xfrm>
+            <a:prstGeom prst="ellipse">
+              <a:avLst/>
+            </a:prstGeom>
+            <a:solidFill>
+              <a:srgbClr val="00FF00"/>
+            </a:solidFill>
+            <a:ln>
+              <a:noFill/>
+            </a:ln>
+          </p:spPr>
+          <p:style>
+            <a:lnRef idx="2">
+              <a:schemeClr val="accent1">
+                <a:shade val="50000"/>
+              </a:schemeClr>
+            </a:lnRef>
+            <a:fillRef idx="1">
+              <a:schemeClr val="accent1"/>
+            </a:fillRef>
+            <a:effectRef idx="0">
+              <a:schemeClr val="accent1"/>
+            </a:effectRef>
+            <a:fontRef idx="minor">
+              <a:schemeClr val="lt1"/>
+            </a:fontRef>
+          </p:style>
+          <p:txBody>
+            <a:bodyPr rtlCol="0" anchor="ctr"/>
+            <a:lstStyle/>
+            <a:p>
+              <a:pPr algn="ctr"/>
+              <a:endParaRPr lang="de-DE"/>
+            </a:p>
+          </p:txBody>
+        </p:sp>
+        <p:sp>
+          <p:nvSpPr>
+            <p:cNvPr id="33" name="Ellipse 32"/>
+            <p:cNvSpPr/>
+            <p:nvPr/>
+          </p:nvSpPr>
+          <p:spPr>
+            <a:xfrm>
+              <a:off x="1663411" y="2041684"/>
+              <a:ext cx="45719" cy="45719"/>
+            </a:xfrm>
+            <a:prstGeom prst="ellipse">
+              <a:avLst/>
+            </a:prstGeom>
+            <a:solidFill>
+              <a:srgbClr val="00FF00"/>
+            </a:solidFill>
+            <a:ln>
+              <a:noFill/>
+            </a:ln>
+          </p:spPr>
+          <p:style>
+            <a:lnRef idx="2">
+              <a:schemeClr val="accent1">
+                <a:shade val="50000"/>
+              </a:schemeClr>
+            </a:lnRef>
+            <a:fillRef idx="1">
+              <a:schemeClr val="accent1"/>
+            </a:fillRef>
+            <a:effectRef idx="0">
+              <a:schemeClr val="accent1"/>
+            </a:effectRef>
+            <a:fontRef idx="minor">
+              <a:schemeClr val="lt1"/>
+            </a:fontRef>
+          </p:style>
+          <p:txBody>
+            <a:bodyPr rtlCol="0" anchor="ctr"/>
+            <a:lstStyle/>
+            <a:p>
+              <a:pPr algn="ctr"/>
+              <a:endParaRPr lang="de-DE"/>
+            </a:p>
+          </p:txBody>
+        </p:sp>
+        <p:sp>
+          <p:nvSpPr>
+            <p:cNvPr id="35" name="Textfeld 34"/>
+            <p:cNvSpPr txBox="1"/>
+            <p:nvPr/>
+          </p:nvSpPr>
+          <p:spPr>
+            <a:xfrm>
+              <a:off x="1654838" y="1181280"/>
+              <a:ext cx="786907" cy="138499"/>
+            </a:xfrm>
+            <a:prstGeom prst="rect">
+              <a:avLst/>
+            </a:prstGeom>
+            <a:noFill/>
+            <a:effectLst>
+              <a:outerShdw blurRad="10160" dist="3810" dir="3600000" algn="t" rotWithShape="0">
+                <a:schemeClr val="tx1"/>
+              </a:outerShdw>
+            </a:effectLst>
+          </p:spPr>
+          <p:txBody>
+            <a:bodyPr wrap="square" lIns="0" tIns="0" rIns="0" bIns="0" rtlCol="0">
+              <a:spAutoFit/>
+            </a:bodyPr>
+            <a:lstStyle/>
+            <a:p>
+              <a:pPr algn="r"/>
+              <a:r>
+                <a:rPr lang="de-DE" b="1" dirty="0" err="1" smtClean="0">
+                  <a:solidFill>
+                    <a:srgbClr val="60FF3B"/>
+                  </a:solidFill>
+                  <a:latin typeface="cmr10" panose="020B0500000000000000" pitchFamily="34" charset="0"/>
+                </a:rPr>
+                <a:t>starbucks</a:t>
+              </a:r>
+              <a:r>
+                <a:rPr lang="de-DE" b="1" dirty="0" smtClean="0">
+                  <a:solidFill>
+                    <a:srgbClr val="60FF3B"/>
+                  </a:solidFill>
+                  <a:latin typeface="cmr10" panose="020B0500000000000000" pitchFamily="34" charset="0"/>
+                </a:rPr>
+                <a:t>-text</a:t>
+              </a:r>
+              <a:endParaRPr lang="de-DE" b="1" dirty="0">
+                <a:solidFill>
+                  <a:srgbClr val="60FF3B"/>
+                </a:solidFill>
+                <a:latin typeface="cmr10" panose="020B0500000000000000" pitchFamily="34" charset="0"/>
+              </a:endParaRPr>
+            </a:p>
+          </p:txBody>
+        </p:sp>
+        <p:sp>
+          <p:nvSpPr>
+            <p:cNvPr id="36" name="Textfeld 35"/>
+            <p:cNvSpPr txBox="1"/>
+            <p:nvPr/>
+          </p:nvSpPr>
+          <p:spPr>
+            <a:xfrm>
+              <a:off x="2548283" y="1476201"/>
+              <a:ext cx="163612" cy="138499"/>
+            </a:xfrm>
+            <a:prstGeom prst="rect">
+              <a:avLst/>
+            </a:prstGeom>
+            <a:noFill/>
+            <a:effectLst>
+              <a:outerShdw blurRad="10160" dist="3810" dir="3600000" algn="t" rotWithShape="0">
+                <a:schemeClr val="tx1"/>
+              </a:outerShdw>
+            </a:effectLst>
+          </p:spPr>
+          <p:txBody>
+            <a:bodyPr wrap="square" lIns="0" tIns="0" rIns="0" bIns="0" rtlCol="0">
+              <a:spAutoFit/>
+            </a:bodyPr>
+            <a:lstStyle/>
+            <a:p>
+              <a:r>
+                <a:rPr lang="de-DE" b="1" dirty="0" err="1" smtClean="0">
+                  <a:solidFill>
+                    <a:srgbClr val="60FF3B"/>
+                  </a:solidFill>
+                  <a:latin typeface="cmr10" panose="020B0500000000000000" pitchFamily="34" charset="0"/>
+                </a:rPr>
+                <a:t>six</a:t>
+              </a:r>
+              <a:endParaRPr lang="de-DE" b="1" dirty="0">
+                <a:solidFill>
+                  <a:srgbClr val="60FF3B"/>
+                </a:solidFill>
+                <a:latin typeface="cmr10" panose="020B0500000000000000" pitchFamily="34" charset="0"/>
+              </a:endParaRPr>
+            </a:p>
+          </p:txBody>
+        </p:sp>
+      </p:grpSp>
+    </p:spTree>
+    <p:extLst>
+      <p:ext uri="{BB962C8B-B14F-4D97-AF65-F5344CB8AC3E}">
+        <p14:creationId xmlns:p14="http://schemas.microsoft.com/office/powerpoint/2010/main" val="673075764"/>
+      </p:ext>
+    </p:extLst>
+  </p:cSld>
+  <p:clrMapOvr>
+    <a:masterClrMapping/>
+  </p:clrMapOvr>
+</p:sld>
+</file>
+
+<file path=ppt/slides/slide2.xml><?xml version="1.0" encoding="utf-8"?>
+<p:sld xmlns:a="http://schemas.openxmlformats.org/drawingml/2006/main" xmlns:r="http://schemas.openxmlformats.org/officeDocument/2006/relationships" xmlns:p="http://schemas.openxmlformats.org/presentationml/2006/main">
+  <p:cSld>
+    <p:spTree>
+      <p:nvGrpSpPr>
+        <p:cNvPr id="1" name=""/>
+        <p:cNvGrpSpPr/>
+        <p:nvPr/>
+      </p:nvGrpSpPr>
+      <p:grpSpPr>
+        <a:xfrm>
+          <a:off x="0" y="0"/>
+          <a:ext cx="0" cy="0"/>
+          <a:chOff x="0" y="0"/>
+          <a:chExt cx="0" cy="0"/>
+        </a:xfrm>
+      </p:grpSpPr>
       <p:pic>
         <p:nvPicPr>
           <p:cNvPr id="1026" name="Picture 2"/>
@@ -4506,7 +6008,7 @@
 </p:sld>
 </file>
 
-<file path=ppt/slides/slide2.xml><?xml version="1.0" encoding="utf-8"?>
+<file path=ppt/slides/slide3.xml><?xml version="1.0" encoding="utf-8"?>
 <p:sld xmlns:a="http://schemas.openxmlformats.org/drawingml/2006/main" xmlns:r="http://schemas.openxmlformats.org/officeDocument/2006/relationships" xmlns:p="http://schemas.openxmlformats.org/presentationml/2006/main">
   <p:cSld>
     <p:spTree>

</xml_diff>